<commit_message>
Created last min changes.
</commit_message>
<xml_diff>
--- a/GDP_1.pptx
+++ b/GDP_1.pptx
@@ -2095,7 +2095,7 @@
           <a:p>
             <a:fld id="{BB02557A-7053-4340-A874-8AB926A8EDA1}" type="datetimeFigureOut">
               <a:rPr lang="en-US" smtClean="0"/>
-              <a:t>9/1/2020</a:t>
+              <a:t>9/2/2020</a:t>
             </a:fld>
             <a:endParaRPr lang="en-US" dirty="0"/>
           </a:p>
@@ -2281,7 +2281,7 @@
             <a:fld id="{BB02557A-7053-4340-A874-8AB926A8EDA1}" type="datetimeFigureOut">
               <a:rPr lang="en-US" smtClean="0"/>
               <a:pPr/>
-              <a:t>9/1/2020</a:t>
+              <a:t>9/2/2020</a:t>
             </a:fld>
             <a:endParaRPr lang="en-US" dirty="0"/>
           </a:p>
@@ -2472,7 +2472,7 @@
             <a:fld id="{BB02557A-7053-4340-A874-8AB926A8EDA1}" type="datetimeFigureOut">
               <a:rPr lang="en-US" smtClean="0"/>
               <a:pPr/>
-              <a:t>9/1/2020</a:t>
+              <a:t>9/2/2020</a:t>
             </a:fld>
             <a:endParaRPr lang="en-US" dirty="0"/>
           </a:p>
@@ -3020,7 +3020,7 @@
             <a:fld id="{BB02557A-7053-4340-A874-8AB926A8EDA1}" type="datetimeFigureOut">
               <a:rPr lang="en-US" smtClean="0"/>
               <a:pPr/>
-              <a:t>9/1/2020</a:t>
+              <a:t>9/2/2020</a:t>
             </a:fld>
             <a:endParaRPr lang="en-US" dirty="0"/>
           </a:p>
@@ -3299,7 +3299,7 @@
             <a:fld id="{BB02557A-7053-4340-A874-8AB926A8EDA1}" type="datetimeFigureOut">
               <a:rPr lang="en-US" smtClean="0"/>
               <a:pPr/>
-              <a:t>9/1/2020</a:t>
+              <a:t>9/2/2020</a:t>
             </a:fld>
             <a:endParaRPr lang="en-US" dirty="0"/>
           </a:p>
@@ -3542,7 +3542,7 @@
             <a:fld id="{BB02557A-7053-4340-A874-8AB926A8EDA1}" type="datetimeFigureOut">
               <a:rPr lang="en-US" smtClean="0"/>
               <a:pPr/>
-              <a:t>9/1/2020</a:t>
+              <a:t>9/2/2020</a:t>
             </a:fld>
             <a:endParaRPr lang="en-US" dirty="0"/>
           </a:p>
@@ -3912,7 +3912,7 @@
             <a:fld id="{BB02557A-7053-4340-A874-8AB926A8EDA1}" type="datetimeFigureOut">
               <a:rPr lang="en-US" smtClean="0"/>
               <a:pPr/>
-              <a:t>9/1/2020</a:t>
+              <a:t>9/2/2020</a:t>
             </a:fld>
             <a:endParaRPr lang="en-US" dirty="0"/>
           </a:p>
@@ -4063,7 +4063,7 @@
           <a:p>
             <a:fld id="{BB02557A-7053-4340-A874-8AB926A8EDA1}" type="datetimeFigureOut">
               <a:rPr lang="en-US" smtClean="0"/>
-              <a:t>9/1/2020</a:t>
+              <a:t>9/2/2020</a:t>
             </a:fld>
             <a:endParaRPr lang="en-US" dirty="0"/>
           </a:p>
@@ -4168,7 +4168,7 @@
           <a:p>
             <a:fld id="{BB02557A-7053-4340-A874-8AB926A8EDA1}" type="datetimeFigureOut">
               <a:rPr lang="en-US" smtClean="0"/>
-              <a:t>9/1/2020</a:t>
+              <a:t>9/2/2020</a:t>
             </a:fld>
             <a:endParaRPr lang="en-US" dirty="0"/>
           </a:p>
@@ -4540,7 +4540,7 @@
             <a:fld id="{BB02557A-7053-4340-A874-8AB926A8EDA1}" type="datetimeFigureOut">
               <a:rPr lang="en-US" smtClean="0"/>
               <a:pPr/>
-              <a:t>9/1/2020</a:t>
+              <a:t>9/2/2020</a:t>
             </a:fld>
             <a:endParaRPr lang="en-US" dirty="0"/>
           </a:p>
@@ -4908,7 +4908,7 @@
             <a:fld id="{BB02557A-7053-4340-A874-8AB926A8EDA1}" type="datetimeFigureOut">
               <a:rPr lang="en-US" smtClean="0"/>
               <a:pPr/>
-              <a:t>9/1/2020</a:t>
+              <a:t>9/2/2020</a:t>
             </a:fld>
             <a:endParaRPr lang="en-US" dirty="0"/>
           </a:p>
@@ -5161,7 +5161,7 @@
             <a:fld id="{BB02557A-7053-4340-A874-8AB926A8EDA1}" type="datetimeFigureOut">
               <a:rPr lang="en-US" smtClean="0"/>
               <a:pPr/>
-              <a:t>9/1/2020</a:t>
+              <a:t>9/2/2020</a:t>
             </a:fld>
             <a:endParaRPr lang="en-US" dirty="0"/>
           </a:p>
@@ -5725,6 +5725,36 @@
           </a:ln>
         </p:spPr>
       </p:pic>
+      <p:pic>
+        <p:nvPicPr>
+          <p:cNvPr id="2" name="Picture 1">
+            <a:extLst>
+              <a:ext uri="{FF2B5EF4-FFF2-40B4-BE49-F238E27FC236}">
+                <a16:creationId xmlns:a16="http://schemas.microsoft.com/office/drawing/2014/main" id="{D6F5A7ED-2E9D-4AF8-91AF-C9A2A8DE7C7B}"/>
+              </a:ext>
+            </a:extLst>
+          </p:cNvPr>
+          <p:cNvPicPr>
+            <a:picLocks noChangeAspect="1"/>
+          </p:cNvPicPr>
+          <p:nvPr/>
+        </p:nvPicPr>
+        <p:blipFill>
+          <a:blip r:embed="rId4"/>
+          <a:stretch>
+            <a:fillRect/>
+          </a:stretch>
+        </p:blipFill>
+        <p:spPr>
+          <a:xfrm>
+            <a:off x="18207" y="10241"/>
+            <a:ext cx="9125793" cy="5133259"/>
+          </a:xfrm>
+          <a:prstGeom prst="rect">
+            <a:avLst/>
+          </a:prstGeom>
+        </p:spPr>
+      </p:pic>
     </p:spTree>
   </p:cSld>
   <p:clrMapOvr>
@@ -6064,6 +6094,26 @@
             <a:r>
               <a:rPr lang="en" sz="2400" dirty="0"/>
               <a:t>Adding group challenges as well as setting up user challenge creation.</a:t>
+            </a:r>
+          </a:p>
+          <a:p>
+            <a:pPr marL="285750" lvl="0" indent="-285750" algn="l" rtl="0">
+              <a:spcBef>
+                <a:spcPts val="1600"/>
+              </a:spcBef>
+              <a:spcAft>
+                <a:spcPts val="0"/>
+              </a:spcAft>
+              <a:buFont typeface="Arial" panose="020B0604020202020204" pitchFamily="34" charset="0"/>
+              <a:buChar char="•"/>
+            </a:pPr>
+            <a:r>
+              <a:rPr lang="en" sz="2400" dirty="0"/>
+              <a:t>Creating a food chart with predefined ca</a:t>
+            </a:r>
+            <a:r>
+              <a:rPr lang="en-US" sz="2400"/>
+              <a:t>lories.</a:t>
             </a:r>
             <a:endParaRPr sz="2400" dirty="0"/>
           </a:p>
@@ -7104,7 +7154,43 @@
             </a:pPr>
             <a:r>
               <a:rPr lang="en" sz="1800" dirty="0"/>
-              <a:t>Using this app, the user can monitor their activity and understand how they can improve or manage daily activities. </a:t>
+              <a:t>User</a:t>
+            </a:r>
+            <a:r>
+              <a:rPr lang="en-US" sz="1800" dirty="0"/>
+              <a:t>s can</a:t>
+            </a:r>
+            <a:r>
+              <a:rPr lang="en" sz="1800" dirty="0"/>
+              <a:t> moni</a:t>
+            </a:r>
+            <a:r>
+              <a:rPr lang="en-US" sz="1800" dirty="0"/>
+              <a:t>tor</a:t>
+            </a:r>
+            <a:r>
+              <a:rPr lang="en" sz="1800" dirty="0"/>
+              <a:t> their </a:t>
+            </a:r>
+            <a:r>
+              <a:rPr lang="en-US" sz="1800" b="1" dirty="0"/>
+              <a:t>daily </a:t>
+            </a:r>
+            <a:r>
+              <a:rPr lang="en" sz="1800" b="1" dirty="0"/>
+              <a:t>activity </a:t>
+            </a:r>
+            <a:r>
+              <a:rPr lang="en" sz="1800" dirty="0"/>
+              <a:t>and understand to improve </a:t>
+            </a:r>
+            <a:r>
+              <a:rPr lang="en-US" sz="1800" dirty="0"/>
+              <a:t>or manage </a:t>
+            </a:r>
+            <a:r>
+              <a:rPr lang="en" sz="1800" dirty="0"/>
+              <a:t>accordingly. </a:t>
             </a:r>
             <a:endParaRPr sz="1800" dirty="0"/>
           </a:p>
@@ -7116,16 +7202,25 @@
               <a:spcAft>
                 <a:spcPts val="0"/>
               </a:spcAft>
-              <a:buClr>
-                <a:schemeClr val="dk1"/>
-              </a:buClr>
               <a:buSzPct val="125000"/>
               <a:buFont typeface="Arial" panose="020B0604020202020204" pitchFamily="34" charset="0"/>
               <a:buChar char="•"/>
             </a:pPr>
             <a:r>
-              <a:rPr lang="en" sz="1800" dirty="0"/>
-              <a:t>With this app, users can set goals they want to reach, such as losing or gaining weight. To let users monitor their eating habits, apps of this type should have a food logging feature.</a:t>
+              <a:rPr lang="en-US" sz="1800" b="1" dirty="0"/>
+              <a:t>Personal Goals </a:t>
+            </a:r>
+            <a:r>
+              <a:rPr lang="en-US" sz="1800" dirty="0"/>
+              <a:t>can be set for activities like walking, sleeping, eating and drinking enough water.  A </a:t>
+            </a:r>
+            <a:r>
+              <a:rPr lang="en-US" sz="1800" b="1" dirty="0"/>
+              <a:t>daily logging system </a:t>
+            </a:r>
+            <a:r>
+              <a:rPr lang="en-US" sz="1800" dirty="0"/>
+              <a:t>is created to do so.</a:t>
             </a:r>
             <a:endParaRPr sz="1800" dirty="0"/>
           </a:p>
@@ -7143,9 +7238,36 @@
             </a:pPr>
             <a:r>
               <a:rPr lang="en" sz="1800" dirty="0"/>
-              <a:t>Every user can set a personal goal for each activity and see if they can reach it or not.</a:t>
-            </a:r>
-            <a:endParaRPr sz="1800" dirty="0"/>
+              <a:t> </a:t>
+            </a:r>
+            <a:r>
+              <a:rPr lang="en-US" sz="1800" dirty="0"/>
+              <a:t>Users and administrators can </a:t>
+            </a:r>
+            <a:r>
+              <a:rPr lang="en-US" sz="1800" b="1" dirty="0"/>
+              <a:t>create challenges </a:t>
+            </a:r>
+            <a:r>
+              <a:rPr lang="en-US" sz="1800" dirty="0"/>
+              <a:t>which can be taken as a </a:t>
+            </a:r>
+            <a:r>
+              <a:rPr lang="en-US" sz="1800" b="1" dirty="0"/>
+              <a:t>group </a:t>
+            </a:r>
+            <a:r>
+              <a:rPr lang="en-US" sz="1800" dirty="0"/>
+              <a:t>or be specific to an </a:t>
+            </a:r>
+            <a:r>
+              <a:rPr lang="en-US" sz="1800" b="1" dirty="0"/>
+              <a:t>individual</a:t>
+            </a:r>
+            <a:r>
+              <a:rPr lang="en-US" sz="1800" dirty="0"/>
+              <a:t>.  </a:t>
+            </a:r>
           </a:p>
           <a:p>
             <a:pPr marL="171450" lvl="0" indent="-171450" algn="l" rtl="0">
@@ -7160,29 +7282,50 @@
               <a:buChar char="•"/>
             </a:pPr>
             <a:r>
-              <a:rPr lang="en" sz="1800" dirty="0"/>
-              <a:t> They can accept challenges created by admins and also can create their own challenge among their friends or groups.</a:t>
-            </a:r>
-            <a:endParaRPr sz="1800" dirty="0"/>
-          </a:p>
-          <a:p>
-            <a:pPr marL="0" lvl="0" indent="0" algn="l" rtl="0">
+              <a:rPr lang="en-US" sz="1800" dirty="0"/>
+              <a:t>Administrators have </a:t>
+            </a:r>
+            <a:r>
+              <a:rPr lang="en-US" sz="1800" b="1" dirty="0"/>
+              <a:t>access to all data </a:t>
+            </a:r>
+            <a:r>
+              <a:rPr lang="en-US" sz="1800" dirty="0"/>
+              <a:t>within the app and determine the </a:t>
+            </a:r>
+            <a:r>
+              <a:rPr lang="en-US" sz="1800" b="1" dirty="0"/>
+              <a:t>winners</a:t>
+            </a:r>
+            <a:r>
+              <a:rPr lang="en-US" sz="1800" dirty="0"/>
+              <a:t> of the challenges. </a:t>
+            </a:r>
+          </a:p>
+          <a:p>
+            <a:pPr marL="171450" lvl="0" indent="-171450" algn="l" rtl="0">
               <a:spcBef>
                 <a:spcPts val="1600"/>
               </a:spcBef>
               <a:spcAft>
-                <a:spcPts val="1600"/>
+                <a:spcPts val="0"/>
               </a:spcAft>
-              <a:buNone/>
+              <a:buSzPct val="125000"/>
+              <a:buFont typeface="Arial" panose="020B0604020202020204" pitchFamily="34" charset="0"/>
+              <a:buChar char="•"/>
             </a:pPr>
-            <a:endParaRPr sz="1200" dirty="0">
-              <a:solidFill>
-                <a:srgbClr val="24292E"/>
-              </a:solidFill>
-              <a:highlight>
-                <a:srgbClr val="FFFFFF"/>
-              </a:highlight>
-            </a:endParaRPr>
+            <a:r>
+              <a:rPr lang="en-US" sz="1800" dirty="0"/>
+              <a:t>Data gathered will be used for </a:t>
+            </a:r>
+            <a:r>
+              <a:rPr lang="en-US" sz="1800" b="1" dirty="0"/>
+              <a:t>further research</a:t>
+            </a:r>
+            <a:r>
+              <a:rPr lang="en-US" sz="1800" dirty="0"/>
+              <a:t>.</a:t>
+            </a:r>
           </a:p>
         </p:txBody>
       </p:sp>

</xml_diff>

<commit_message>
Added changing colors of app line in future work.
</commit_message>
<xml_diff>
--- a/GDP_1.pptx
+++ b/GDP_1.pptx
@@ -6059,7 +6059,23 @@
             </a:pPr>
             <a:r>
               <a:rPr lang="en" sz="2400" dirty="0"/>
-              <a:t>Redefining new tasks for updating.</a:t>
+              <a:t>Redefining new tasks for </a:t>
+            </a:r>
+            <a:r>
+              <a:rPr lang="en-US" sz="2400" dirty="0"/>
+              <a:t>automated</a:t>
+            </a:r>
+            <a:r>
+              <a:rPr lang="en" sz="2400" dirty="0"/>
+              <a:t> updat</a:t>
+            </a:r>
+            <a:r>
+              <a:rPr lang="en-US" sz="2400" dirty="0"/>
+              <a:t>ion</a:t>
+            </a:r>
+            <a:r>
+              <a:rPr lang="en" sz="2400" dirty="0"/>
+              <a:t>.</a:t>
             </a:r>
             <a:endParaRPr sz="2400" dirty="0"/>
           </a:p>
@@ -6112,8 +6128,32 @@
               <a:t>Creating a food chart with predefined ca</a:t>
             </a:r>
             <a:r>
-              <a:rPr lang="en-US" sz="2400"/>
+              <a:rPr lang="en-US" sz="2400" dirty="0"/>
               <a:t>lories.</a:t>
+            </a:r>
+          </a:p>
+          <a:p>
+            <a:pPr marL="285750" lvl="0" indent="-285750" algn="l" rtl="0">
+              <a:spcBef>
+                <a:spcPts val="1600"/>
+              </a:spcBef>
+              <a:spcAft>
+                <a:spcPts val="0"/>
+              </a:spcAft>
+              <a:buFont typeface="Arial" panose="020B0604020202020204" pitchFamily="34" charset="0"/>
+              <a:buChar char="•"/>
+            </a:pPr>
+            <a:r>
+              <a:rPr lang="en-US" sz="2400" dirty="0"/>
+              <a:t>Changing the </a:t>
+            </a:r>
+            <a:r>
+              <a:rPr lang="en-US" sz="2400" b="1" dirty="0"/>
+              <a:t>colors of the application </a:t>
+            </a:r>
+            <a:r>
+              <a:rPr lang="en-US" sz="2400" dirty="0"/>
+              <a:t>as desired by the user.</a:t>
             </a:r>
             <a:endParaRPr sz="2400" dirty="0"/>
           </a:p>

</xml_diff>

<commit_message>
Modified PPT and colors for UI sketches
</commit_message>
<xml_diff>
--- a/GDP_1.pptx
+++ b/GDP_1.pptx
@@ -2095,7 +2095,7 @@
           <a:p>
             <a:fld id="{BB02557A-7053-4340-A874-8AB926A8EDA1}" type="datetimeFigureOut">
               <a:rPr lang="en-US" smtClean="0"/>
-              <a:t>9/1/2020</a:t>
+              <a:t>9/3/2020</a:t>
             </a:fld>
             <a:endParaRPr lang="en-US" dirty="0"/>
           </a:p>
@@ -2281,7 +2281,7 @@
             <a:fld id="{BB02557A-7053-4340-A874-8AB926A8EDA1}" type="datetimeFigureOut">
               <a:rPr lang="en-US" smtClean="0"/>
               <a:pPr/>
-              <a:t>9/1/2020</a:t>
+              <a:t>9/3/2020</a:t>
             </a:fld>
             <a:endParaRPr lang="en-US" dirty="0"/>
           </a:p>
@@ -2472,7 +2472,7 @@
             <a:fld id="{BB02557A-7053-4340-A874-8AB926A8EDA1}" type="datetimeFigureOut">
               <a:rPr lang="en-US" smtClean="0"/>
               <a:pPr/>
-              <a:t>9/1/2020</a:t>
+              <a:t>9/3/2020</a:t>
             </a:fld>
             <a:endParaRPr lang="en-US" dirty="0"/>
           </a:p>
@@ -3020,7 +3020,7 @@
             <a:fld id="{BB02557A-7053-4340-A874-8AB926A8EDA1}" type="datetimeFigureOut">
               <a:rPr lang="en-US" smtClean="0"/>
               <a:pPr/>
-              <a:t>9/1/2020</a:t>
+              <a:t>9/3/2020</a:t>
             </a:fld>
             <a:endParaRPr lang="en-US" dirty="0"/>
           </a:p>
@@ -3299,7 +3299,7 @@
             <a:fld id="{BB02557A-7053-4340-A874-8AB926A8EDA1}" type="datetimeFigureOut">
               <a:rPr lang="en-US" smtClean="0"/>
               <a:pPr/>
-              <a:t>9/1/2020</a:t>
+              <a:t>9/3/2020</a:t>
             </a:fld>
             <a:endParaRPr lang="en-US" dirty="0"/>
           </a:p>
@@ -3542,7 +3542,7 @@
             <a:fld id="{BB02557A-7053-4340-A874-8AB926A8EDA1}" type="datetimeFigureOut">
               <a:rPr lang="en-US" smtClean="0"/>
               <a:pPr/>
-              <a:t>9/1/2020</a:t>
+              <a:t>9/3/2020</a:t>
             </a:fld>
             <a:endParaRPr lang="en-US" dirty="0"/>
           </a:p>
@@ -3912,7 +3912,7 @@
             <a:fld id="{BB02557A-7053-4340-A874-8AB926A8EDA1}" type="datetimeFigureOut">
               <a:rPr lang="en-US" smtClean="0"/>
               <a:pPr/>
-              <a:t>9/1/2020</a:t>
+              <a:t>9/3/2020</a:t>
             </a:fld>
             <a:endParaRPr lang="en-US" dirty="0"/>
           </a:p>
@@ -4063,7 +4063,7 @@
           <a:p>
             <a:fld id="{BB02557A-7053-4340-A874-8AB926A8EDA1}" type="datetimeFigureOut">
               <a:rPr lang="en-US" smtClean="0"/>
-              <a:t>9/1/2020</a:t>
+              <a:t>9/3/2020</a:t>
             </a:fld>
             <a:endParaRPr lang="en-US" dirty="0"/>
           </a:p>
@@ -4168,7 +4168,7 @@
           <a:p>
             <a:fld id="{BB02557A-7053-4340-A874-8AB926A8EDA1}" type="datetimeFigureOut">
               <a:rPr lang="en-US" smtClean="0"/>
-              <a:t>9/1/2020</a:t>
+              <a:t>9/3/2020</a:t>
             </a:fld>
             <a:endParaRPr lang="en-US" dirty="0"/>
           </a:p>
@@ -4540,7 +4540,7 @@
             <a:fld id="{BB02557A-7053-4340-A874-8AB926A8EDA1}" type="datetimeFigureOut">
               <a:rPr lang="en-US" smtClean="0"/>
               <a:pPr/>
-              <a:t>9/1/2020</a:t>
+              <a:t>9/3/2020</a:t>
             </a:fld>
             <a:endParaRPr lang="en-US" dirty="0"/>
           </a:p>
@@ -4908,7 +4908,7 @@
             <a:fld id="{BB02557A-7053-4340-A874-8AB926A8EDA1}" type="datetimeFigureOut">
               <a:rPr lang="en-US" smtClean="0"/>
               <a:pPr/>
-              <a:t>9/1/2020</a:t>
+              <a:t>9/3/2020</a:t>
             </a:fld>
             <a:endParaRPr lang="en-US" dirty="0"/>
           </a:p>
@@ -5161,7 +5161,7 @@
             <a:fld id="{BB02557A-7053-4340-A874-8AB926A8EDA1}" type="datetimeFigureOut">
               <a:rPr lang="en-US" smtClean="0"/>
               <a:pPr/>
-              <a:t>9/1/2020</a:t>
+              <a:t>9/3/2020</a:t>
             </a:fld>
             <a:endParaRPr lang="en-US" dirty="0"/>
           </a:p>
@@ -7205,13 +7205,19 @@
       </p:sp>
       <p:pic>
         <p:nvPicPr>
-          <p:cNvPr id="76" name="Google Shape;76;p16"/>
-          <p:cNvPicPr preferRelativeResize="0"/>
+          <p:cNvPr id="2" name="Picture 1"/>
+          <p:cNvPicPr>
+            <a:picLocks noChangeAspect="1"/>
+          </p:cNvPicPr>
           <p:nvPr/>
         </p:nvPicPr>
         <p:blipFill>
           <a:blip r:embed="rId3">
-            <a:alphaModFix/>
+            <a:extLst>
+              <a:ext uri="{28A0092B-C50C-407E-A947-70E740481C1C}">
+                <a14:useLocalDpi xmlns:a14="http://schemas.microsoft.com/office/drawing/2010/main" val="0"/>
+              </a:ext>
+            </a:extLst>
           </a:blip>
           <a:stretch>
             <a:fillRect/>
@@ -7219,27 +7225,29 @@
         </p:blipFill>
         <p:spPr>
           <a:xfrm>
-            <a:off x="2946059" y="430848"/>
-            <a:ext cx="2568694" cy="4373563"/>
+            <a:off x="2837792" y="84165"/>
+            <a:ext cx="2775987" cy="4981822"/>
           </a:xfrm>
           <a:prstGeom prst="rect">
             <a:avLst/>
           </a:prstGeom>
-          <a:noFill/>
-          <a:ln>
-            <a:noFill/>
-          </a:ln>
         </p:spPr>
       </p:pic>
       <p:pic>
         <p:nvPicPr>
-          <p:cNvPr id="77" name="Google Shape;77;p16"/>
-          <p:cNvPicPr preferRelativeResize="0"/>
+          <p:cNvPr id="3" name="Picture 2"/>
+          <p:cNvPicPr>
+            <a:picLocks noChangeAspect="1"/>
+          </p:cNvPicPr>
           <p:nvPr/>
         </p:nvPicPr>
         <p:blipFill>
           <a:blip r:embed="rId4">
-            <a:alphaModFix/>
+            <a:extLst>
+              <a:ext uri="{28A0092B-C50C-407E-A947-70E740481C1C}">
+                <a14:useLocalDpi xmlns:a14="http://schemas.microsoft.com/office/drawing/2010/main" val="0"/>
+              </a:ext>
+            </a:extLst>
           </a:blip>
           <a:stretch>
             <a:fillRect/>
@@ -7247,16 +7255,12 @@
         </p:blipFill>
         <p:spPr>
           <a:xfrm>
-            <a:off x="5951526" y="402494"/>
-            <a:ext cx="2568694" cy="4373564"/>
+            <a:off x="6062177" y="84165"/>
+            <a:ext cx="2806921" cy="4981822"/>
           </a:xfrm>
           <a:prstGeom prst="rect">
             <a:avLst/>
           </a:prstGeom>
-          <a:noFill/>
-          <a:ln>
-            <a:noFill/>
-          </a:ln>
         </p:spPr>
       </p:pic>
     </p:spTree>
@@ -7328,13 +7332,19 @@
       </p:sp>
       <p:pic>
         <p:nvPicPr>
-          <p:cNvPr id="84" name="Google Shape;84;p17"/>
-          <p:cNvPicPr preferRelativeResize="0"/>
+          <p:cNvPr id="2" name="Picture 1"/>
+          <p:cNvPicPr>
+            <a:picLocks noChangeAspect="1"/>
+          </p:cNvPicPr>
           <p:nvPr/>
         </p:nvPicPr>
         <p:blipFill>
           <a:blip r:embed="rId3">
-            <a:alphaModFix/>
+            <a:extLst>
+              <a:ext uri="{28A0092B-C50C-407E-A947-70E740481C1C}">
+                <a14:useLocalDpi xmlns:a14="http://schemas.microsoft.com/office/drawing/2010/main" val="0"/>
+              </a:ext>
+            </a:extLst>
           </a:blip>
           <a:stretch>
             <a:fillRect/>
@@ -7342,44 +7352,12 @@
         </p:blipFill>
         <p:spPr>
           <a:xfrm>
-            <a:off x="2663546" y="431279"/>
-            <a:ext cx="2546525" cy="4280941"/>
+            <a:off x="2681580" y="119926"/>
+            <a:ext cx="2783799" cy="4950002"/>
           </a:xfrm>
           <a:prstGeom prst="rect">
             <a:avLst/>
           </a:prstGeom>
-          <a:noFill/>
-          <a:ln>
-            <a:noFill/>
-          </a:ln>
-        </p:spPr>
-      </p:pic>
-      <p:pic>
-        <p:nvPicPr>
-          <p:cNvPr id="85" name="Google Shape;85;p17"/>
-          <p:cNvPicPr preferRelativeResize="0"/>
-          <p:nvPr/>
-        </p:nvPicPr>
-        <p:blipFill>
-          <a:blip r:embed="rId4">
-            <a:alphaModFix/>
-          </a:blip>
-          <a:stretch>
-            <a:fillRect/>
-          </a:stretch>
-        </p:blipFill>
-        <p:spPr>
-          <a:xfrm>
-            <a:off x="5854721" y="430848"/>
-            <a:ext cx="2546525" cy="4414830"/>
-          </a:xfrm>
-          <a:prstGeom prst="rect">
-            <a:avLst/>
-          </a:prstGeom>
-          <a:noFill/>
-          <a:ln>
-            <a:noFill/>
-          </a:ln>
         </p:spPr>
       </p:pic>
     </p:spTree>

</xml_diff>

<commit_message>
Changed the color of the app and renamed the challenges' names.
</commit_message>
<xml_diff>
--- a/GDP_1.pptx
+++ b/GDP_1.pptx
@@ -19,7 +19,7 @@
     <p:sldId id="264" r:id="rId10"/>
     <p:sldId id="265" r:id="rId11"/>
     <p:sldId id="266" r:id="rId12"/>
-    <p:sldId id="267" r:id="rId13"/>
+    <p:sldId id="272" r:id="rId13"/>
     <p:sldId id="268" r:id="rId14"/>
     <p:sldId id="269" r:id="rId15"/>
   </p:sldIdLst>
@@ -793,7 +793,7 @@
   <p:cSld>
     <p:spTree>
       <p:nvGrpSpPr>
-        <p:cNvPr id="1" name="Shape 129"/>
+        <p:cNvPr id="1" name="Shape 135"/>
         <p:cNvGrpSpPr/>
         <p:nvPr/>
       </p:nvGrpSpPr>
@@ -807,7 +807,7 @@
       </p:grpSpPr>
       <p:sp>
         <p:nvSpPr>
-          <p:cNvPr id="130" name="Google Shape;130;g93b923dd57_0_0:notes"/>
+          <p:cNvPr id="136" name="Google Shape;136;g93b923dd57_0_5:notes"/>
           <p:cNvSpPr>
             <a:spLocks noGrp="1" noRot="1" noChangeAspect="1"/>
           </p:cNvSpPr>
@@ -848,7 +848,7 @@
       </p:sp>
       <p:sp>
         <p:nvSpPr>
-          <p:cNvPr id="131" name="Google Shape;131;g93b923dd57_0_0:notes"/>
+          <p:cNvPr id="137" name="Google Shape;137;g93b923dd57_0_5:notes"/>
           <p:cNvSpPr txBox="1">
             <a:spLocks noGrp="1"/>
           </p:cNvSpPr>
@@ -893,110 +893,6 @@
 </file>
 
 <file path=ppt/notesSlides/notesSlide12.xml><?xml version="1.0" encoding="utf-8"?>
-<p:notes xmlns:a="http://schemas.openxmlformats.org/drawingml/2006/main" xmlns:r="http://schemas.openxmlformats.org/officeDocument/2006/relationships" xmlns:p="http://schemas.openxmlformats.org/presentationml/2006/main" showMasterSp="0" showMasterPhAnim="0">
-  <p:cSld>
-    <p:spTree>
-      <p:nvGrpSpPr>
-        <p:cNvPr id="1" name="Shape 135"/>
-        <p:cNvGrpSpPr/>
-        <p:nvPr/>
-      </p:nvGrpSpPr>
-      <p:grpSpPr>
-        <a:xfrm>
-          <a:off x="0" y="0"/>
-          <a:ext cx="0" cy="0"/>
-          <a:chOff x="0" y="0"/>
-          <a:chExt cx="0" cy="0"/>
-        </a:xfrm>
-      </p:grpSpPr>
-      <p:sp>
-        <p:nvSpPr>
-          <p:cNvPr id="136" name="Google Shape;136;g93b923dd57_0_5:notes"/>
-          <p:cNvSpPr>
-            <a:spLocks noGrp="1" noRot="1" noChangeAspect="1"/>
-          </p:cNvSpPr>
-          <p:nvPr>
-            <p:ph type="sldImg" idx="2"/>
-          </p:nvPr>
-        </p:nvSpPr>
-        <p:spPr>
-          <a:xfrm>
-            <a:off x="381000" y="685800"/>
-            <a:ext cx="6096000" cy="3429000"/>
-          </a:xfrm>
-          <a:custGeom>
-            <a:avLst/>
-            <a:gdLst/>
-            <a:ahLst/>
-            <a:cxnLst/>
-            <a:rect l="l" t="t" r="r" b="b"/>
-            <a:pathLst>
-              <a:path w="120000" h="120000" extrusionOk="0">
-                <a:moveTo>
-                  <a:pt x="0" y="0"/>
-                </a:moveTo>
-                <a:lnTo>
-                  <a:pt x="120000" y="0"/>
-                </a:lnTo>
-                <a:lnTo>
-                  <a:pt x="120000" y="120000"/>
-                </a:lnTo>
-                <a:lnTo>
-                  <a:pt x="0" y="120000"/>
-                </a:lnTo>
-                <a:close/>
-              </a:path>
-            </a:pathLst>
-          </a:custGeom>
-        </p:spPr>
-      </p:sp>
-      <p:sp>
-        <p:nvSpPr>
-          <p:cNvPr id="137" name="Google Shape;137;g93b923dd57_0_5:notes"/>
-          <p:cNvSpPr txBox="1">
-            <a:spLocks noGrp="1"/>
-          </p:cNvSpPr>
-          <p:nvPr>
-            <p:ph type="body" idx="1"/>
-          </p:nvPr>
-        </p:nvSpPr>
-        <p:spPr>
-          <a:xfrm>
-            <a:off x="685800" y="4343400"/>
-            <a:ext cx="5486400" cy="4114800"/>
-          </a:xfrm>
-          <a:prstGeom prst="rect">
-            <a:avLst/>
-          </a:prstGeom>
-        </p:spPr>
-        <p:txBody>
-          <a:bodyPr spcFirstLastPara="1" wrap="square" lIns="91425" tIns="91425" rIns="91425" bIns="91425" anchor="t" anchorCtr="0">
-            <a:noAutofit/>
-          </a:bodyPr>
-          <a:lstStyle/>
-          <a:p>
-            <a:pPr marL="0" lvl="0" indent="0" algn="l" rtl="0">
-              <a:spcBef>
-                <a:spcPts val="0"/>
-              </a:spcBef>
-              <a:spcAft>
-                <a:spcPts val="0"/>
-              </a:spcAft>
-              <a:buNone/>
-            </a:pPr>
-            <a:endParaRPr/>
-          </a:p>
-        </p:txBody>
-      </p:sp>
-    </p:spTree>
-  </p:cSld>
-  <p:clrMapOvr>
-    <a:masterClrMapping/>
-  </p:clrMapOvr>
-</p:notes>
-</file>
-
-<file path=ppt/notesSlides/notesSlide13.xml><?xml version="1.0" encoding="utf-8"?>
 <p:notes xmlns:a="http://schemas.openxmlformats.org/drawingml/2006/main" xmlns:r="http://schemas.openxmlformats.org/officeDocument/2006/relationships" xmlns:p="http://schemas.openxmlformats.org/presentationml/2006/main" showMasterSp="0" showMasterPhAnim="0">
   <p:cSld>
     <p:spTree>
@@ -5725,6 +5621,36 @@
           </a:ln>
         </p:spPr>
       </p:pic>
+      <p:pic>
+        <p:nvPicPr>
+          <p:cNvPr id="3" name="Picture 2" descr="A screenshot of a tree&#10;&#10;Description automatically generated">
+            <a:extLst>
+              <a:ext uri="{FF2B5EF4-FFF2-40B4-BE49-F238E27FC236}">
+                <a16:creationId xmlns:a16="http://schemas.microsoft.com/office/drawing/2014/main" id="{C1667615-F05A-4088-A7D0-8A7CDA1D2851}"/>
+              </a:ext>
+            </a:extLst>
+          </p:cNvPr>
+          <p:cNvPicPr>
+            <a:picLocks noChangeAspect="1"/>
+          </p:cNvPicPr>
+          <p:nvPr/>
+        </p:nvPicPr>
+        <p:blipFill>
+          <a:blip r:embed="rId4"/>
+          <a:stretch>
+            <a:fillRect/>
+          </a:stretch>
+        </p:blipFill>
+        <p:spPr>
+          <a:xfrm>
+            <a:off x="0" y="0"/>
+            <a:ext cx="9144000" cy="5143500"/>
+          </a:xfrm>
+          <a:prstGeom prst="rect">
+            <a:avLst/>
+          </a:prstGeom>
+        </p:spPr>
+      </p:pic>
     </p:spTree>
   </p:cSld>
   <p:clrMapOvr>
@@ -5938,7 +5864,7 @@
   <p:cSld>
     <p:spTree>
       <p:nvGrpSpPr>
-        <p:cNvPr id="1" name="Shape 132"/>
+        <p:cNvPr id="1" name=""/>
         <p:cNvGrpSpPr/>
         <p:nvPr/>
       </p:nvGrpSpPr>
@@ -5950,138 +5876,42 @@
           <a:chExt cx="0" cy="0"/>
         </a:xfrm>
       </p:grpSpPr>
-      <p:sp>
-        <p:nvSpPr>
-          <p:cNvPr id="133" name="Google Shape;133;p24"/>
-          <p:cNvSpPr txBox="1">
-            <a:spLocks noGrp="1"/>
-          </p:cNvSpPr>
-          <p:nvPr>
-            <p:ph type="title"/>
-          </p:nvPr>
-        </p:nvSpPr>
-        <p:spPr>
-          <a:xfrm>
-            <a:off x="398000" y="445025"/>
-            <a:ext cx="8122500" cy="572700"/>
+      <p:pic>
+        <p:nvPicPr>
+          <p:cNvPr id="3" name="Picture 2" descr="A screenshot of a cell phone&#10;&#10;Description automatically generated">
+            <a:extLst>
+              <a:ext uri="{FF2B5EF4-FFF2-40B4-BE49-F238E27FC236}">
+                <a16:creationId xmlns:a16="http://schemas.microsoft.com/office/drawing/2014/main" id="{A39E6ABF-184F-41E6-9285-AD42FB40220A}"/>
+              </a:ext>
+            </a:extLst>
+          </p:cNvPr>
+          <p:cNvPicPr>
+            <a:picLocks noChangeAspect="1"/>
+          </p:cNvPicPr>
+          <p:nvPr/>
+        </p:nvPicPr>
+        <p:blipFill>
+          <a:blip r:embed="rId2"/>
+          <a:stretch>
+            <a:fillRect/>
+          </a:stretch>
+        </p:blipFill>
+        <p:spPr>
+          <a:xfrm>
+            <a:off x="0" y="0"/>
+            <a:ext cx="9144000" cy="5143500"/>
           </a:xfrm>
           <a:prstGeom prst="rect">
             <a:avLst/>
           </a:prstGeom>
         </p:spPr>
-        <p:txBody>
-          <a:bodyPr spcFirstLastPara="1" wrap="square" lIns="91425" tIns="91425" rIns="91425" bIns="91425" anchor="t" anchorCtr="0">
-            <a:noAutofit/>
-          </a:bodyPr>
-          <a:lstStyle/>
-          <a:p>
-            <a:pPr marL="0" lvl="0" indent="0" algn="l" rtl="0">
-              <a:spcBef>
-                <a:spcPts val="0"/>
-              </a:spcBef>
-              <a:spcAft>
-                <a:spcPts val="0"/>
-              </a:spcAft>
-              <a:buNone/>
-            </a:pPr>
-            <a:r>
-              <a:rPr lang="en" sz="3200" dirty="0"/>
-              <a:t>Enhanced Features</a:t>
-            </a:r>
-            <a:endParaRPr sz="3200" dirty="0"/>
-          </a:p>
-        </p:txBody>
-      </p:sp>
-      <p:sp>
-        <p:nvSpPr>
-          <p:cNvPr id="134" name="Google Shape;134;p24"/>
-          <p:cNvSpPr txBox="1">
-            <a:spLocks noGrp="1"/>
-          </p:cNvSpPr>
-          <p:nvPr>
-            <p:ph type="body" idx="1"/>
-          </p:nvPr>
-        </p:nvSpPr>
-        <p:spPr>
-          <a:xfrm>
-            <a:off x="311700" y="1303750"/>
-            <a:ext cx="8520600" cy="3416400"/>
-          </a:xfrm>
-          <a:prstGeom prst="rect">
-            <a:avLst/>
-          </a:prstGeom>
-        </p:spPr>
-        <p:txBody>
-          <a:bodyPr spcFirstLastPara="1" wrap="square" lIns="91425" tIns="91425" rIns="91425" bIns="91425" anchor="t" anchorCtr="0">
-            <a:noAutofit/>
-          </a:bodyPr>
-          <a:lstStyle/>
-          <a:p>
-            <a:pPr marL="285750" lvl="0" indent="-285750" algn="l" rtl="0">
-              <a:spcBef>
-                <a:spcPts val="0"/>
-              </a:spcBef>
-              <a:spcAft>
-                <a:spcPts val="0"/>
-              </a:spcAft>
-              <a:buFont typeface="Arial" panose="020B0604020202020204" pitchFamily="34" charset="0"/>
-              <a:buChar char="•"/>
-            </a:pPr>
-            <a:r>
-              <a:rPr lang="en" sz="2400" dirty="0"/>
-              <a:t>Redefining new tasks for updating.</a:t>
-            </a:r>
-            <a:endParaRPr sz="2400" dirty="0"/>
-          </a:p>
-          <a:p>
-            <a:pPr marL="285750" lvl="0" indent="-285750" algn="l" rtl="0">
-              <a:spcBef>
-                <a:spcPts val="1600"/>
-              </a:spcBef>
-              <a:spcAft>
-                <a:spcPts val="0"/>
-              </a:spcAft>
-              <a:buFont typeface="Arial" panose="020B0604020202020204" pitchFamily="34" charset="0"/>
-              <a:buChar char="•"/>
-            </a:pPr>
-            <a:r>
-              <a:rPr lang="en" sz="2400" dirty="0"/>
-              <a:t>Collab with google maps API, and step count apps.</a:t>
-            </a:r>
-            <a:endParaRPr sz="2400" dirty="0"/>
-          </a:p>
-          <a:p>
-            <a:pPr marL="285750" lvl="0" indent="-285750" algn="l" rtl="0">
-              <a:spcBef>
-                <a:spcPts val="1600"/>
-              </a:spcBef>
-              <a:spcAft>
-                <a:spcPts val="0"/>
-              </a:spcAft>
-              <a:buFont typeface="Arial" panose="020B0604020202020204" pitchFamily="34" charset="0"/>
-              <a:buChar char="•"/>
-            </a:pPr>
-            <a:r>
-              <a:rPr lang="en" sz="2400" dirty="0"/>
-              <a:t>Adding group challenges as well as setting up user challenge creation.</a:t>
-            </a:r>
-            <a:endParaRPr sz="2400" dirty="0"/>
-          </a:p>
-          <a:p>
-            <a:pPr marL="0" lvl="0" indent="0" algn="l" rtl="0">
-              <a:spcBef>
-                <a:spcPts val="1600"/>
-              </a:spcBef>
-              <a:spcAft>
-                <a:spcPts val="1600"/>
-              </a:spcAft>
-              <a:buNone/>
-            </a:pPr>
-            <a:endParaRPr dirty="0"/>
-          </a:p>
-        </p:txBody>
-      </p:sp>
+      </p:pic>
     </p:spTree>
+    <p:extLst>
+      <p:ext uri="{BB962C8B-B14F-4D97-AF65-F5344CB8AC3E}">
+        <p14:creationId xmlns:p14="http://schemas.microsoft.com/office/powerpoint/2010/main" val="3114038181"/>
+      </p:ext>
+    </p:extLst>
   </p:cSld>
   <p:clrMapOvr>
     <a:masterClrMapping/>

</xml_diff>